<commit_message>
Tweaked invokeWrapper; Documentation Updates
</commit_message>
<xml_diff>
--- a/doc/ImpactEvaluatorsGrant.pptx
+++ b/doc/ImpactEvaluatorsGrant.pptx
@@ -202,7 +202,7 @@
           <a:p>
             <a:fld id="{E831CBA5-123E-BD4B-A1AD-4A2D18A6CEB5}" type="datetimeFigureOut">
               <a:rPr lang="en-US" smtClean="0"/>
-              <a:t>2/6/23</a:t>
+              <a:t>2/7/23</a:t>
             </a:fld>
             <a:endParaRPr lang="en-US"/>
           </a:p>
@@ -784,7 +784,7 @@
           <a:p>
             <a:fld id="{A2830E4D-9FF7-EF4E-954F-ED7BC4209C93}" type="datetimeFigureOut">
               <a:rPr lang="en-US" smtClean="0"/>
-              <a:t>2/6/23</a:t>
+              <a:t>2/7/23</a:t>
             </a:fld>
             <a:endParaRPr lang="en-US"/>
           </a:p>
@@ -982,7 +982,7 @@
           <a:p>
             <a:fld id="{A2830E4D-9FF7-EF4E-954F-ED7BC4209C93}" type="datetimeFigureOut">
               <a:rPr lang="en-US" smtClean="0"/>
-              <a:t>2/6/23</a:t>
+              <a:t>2/7/23</a:t>
             </a:fld>
             <a:endParaRPr lang="en-US"/>
           </a:p>
@@ -1190,7 +1190,7 @@
           <a:p>
             <a:fld id="{A2830E4D-9FF7-EF4E-954F-ED7BC4209C93}" type="datetimeFigureOut">
               <a:rPr lang="en-US" smtClean="0"/>
-              <a:t>2/6/23</a:t>
+              <a:t>2/7/23</a:t>
             </a:fld>
             <a:endParaRPr lang="en-US"/>
           </a:p>
@@ -1388,7 +1388,7 @@
           <a:p>
             <a:fld id="{A2830E4D-9FF7-EF4E-954F-ED7BC4209C93}" type="datetimeFigureOut">
               <a:rPr lang="en-US" smtClean="0"/>
-              <a:t>2/6/23</a:t>
+              <a:t>2/7/23</a:t>
             </a:fld>
             <a:endParaRPr lang="en-US"/>
           </a:p>
@@ -1663,7 +1663,7 @@
           <a:p>
             <a:fld id="{A2830E4D-9FF7-EF4E-954F-ED7BC4209C93}" type="datetimeFigureOut">
               <a:rPr lang="en-US" smtClean="0"/>
-              <a:t>2/6/23</a:t>
+              <a:t>2/7/23</a:t>
             </a:fld>
             <a:endParaRPr lang="en-US"/>
           </a:p>
@@ -1928,7 +1928,7 @@
           <a:p>
             <a:fld id="{A2830E4D-9FF7-EF4E-954F-ED7BC4209C93}" type="datetimeFigureOut">
               <a:rPr lang="en-US" smtClean="0"/>
-              <a:t>2/6/23</a:t>
+              <a:t>2/7/23</a:t>
             </a:fld>
             <a:endParaRPr lang="en-US"/>
           </a:p>
@@ -2340,7 +2340,7 @@
           <a:p>
             <a:fld id="{A2830E4D-9FF7-EF4E-954F-ED7BC4209C93}" type="datetimeFigureOut">
               <a:rPr lang="en-US" smtClean="0"/>
-              <a:t>2/6/23</a:t>
+              <a:t>2/7/23</a:t>
             </a:fld>
             <a:endParaRPr lang="en-US"/>
           </a:p>
@@ -2481,7 +2481,7 @@
           <a:p>
             <a:fld id="{A2830E4D-9FF7-EF4E-954F-ED7BC4209C93}" type="datetimeFigureOut">
               <a:rPr lang="en-US" smtClean="0"/>
-              <a:t>2/6/23</a:t>
+              <a:t>2/7/23</a:t>
             </a:fld>
             <a:endParaRPr lang="en-US"/>
           </a:p>
@@ -2594,7 +2594,7 @@
           <a:p>
             <a:fld id="{A2830E4D-9FF7-EF4E-954F-ED7BC4209C93}" type="datetimeFigureOut">
               <a:rPr lang="en-US" smtClean="0"/>
-              <a:t>2/6/23</a:t>
+              <a:t>2/7/23</a:t>
             </a:fld>
             <a:endParaRPr lang="en-US"/>
           </a:p>
@@ -2905,7 +2905,7 @@
           <a:p>
             <a:fld id="{A2830E4D-9FF7-EF4E-954F-ED7BC4209C93}" type="datetimeFigureOut">
               <a:rPr lang="en-US" smtClean="0"/>
-              <a:t>2/6/23</a:t>
+              <a:t>2/7/23</a:t>
             </a:fld>
             <a:endParaRPr lang="en-US"/>
           </a:p>
@@ -3193,7 +3193,7 @@
           <a:p>
             <a:fld id="{A2830E4D-9FF7-EF4E-954F-ED7BC4209C93}" type="datetimeFigureOut">
               <a:rPr lang="en-US" smtClean="0"/>
-              <a:t>2/6/23</a:t>
+              <a:t>2/7/23</a:t>
             </a:fld>
             <a:endParaRPr lang="en-US"/>
           </a:p>
@@ -3434,7 +3434,7 @@
           <a:p>
             <a:fld id="{A2830E4D-9FF7-EF4E-954F-ED7BC4209C93}" type="datetimeFigureOut">
               <a:rPr lang="en-US" smtClean="0"/>
-              <a:t>2/6/23</a:t>
+              <a:t>2/7/23</a:t>
             </a:fld>
             <a:endParaRPr lang="en-US"/>
           </a:p>
@@ -7217,7 +7217,7 @@
         <p:spPr>
           <a:xfrm>
             <a:off x="358815" y="6006020"/>
-            <a:ext cx="2245489" cy="369332"/>
+            <a:ext cx="2245489" cy="553998"/>
           </a:xfrm>
           <a:prstGeom prst="rect">
             <a:avLst/>
@@ -7248,6 +7248,34 @@
               </a:rPr>
               <a:t>` Team</a:t>
             </a:r>
+          </a:p>
+          <a:p>
+            <a:r>
+              <a:rPr lang="en-US" sz="1200" dirty="0">
+                <a:solidFill>
+                  <a:schemeClr val="accent5">
+                    <a:lumMod val="75000"/>
+                  </a:schemeClr>
+                </a:solidFill>
+                <a:latin typeface="+mj-lt"/>
+                <a:hlinkClick r:id="rId2">
+                  <a:extLst>
+                    <a:ext uri="{A12FA001-AC4F-418D-AE19-62706E023703}">
+                      <ahyp:hlinkClr xmlns:ahyp="http://schemas.microsoft.com/office/drawing/2018/hyperlinkcolor" val="tx"/>
+                    </a:ext>
+                  </a:extLst>
+                </a:hlinkClick>
+              </a:rPr>
+              <a:t>Impact Evaluator Git Repository</a:t>
+            </a:r>
+            <a:endParaRPr lang="en-US" sz="1200" dirty="0">
+              <a:solidFill>
+                <a:schemeClr val="accent5">
+                  <a:lumMod val="75000"/>
+                </a:schemeClr>
+              </a:solidFill>
+              <a:latin typeface="+mj-lt"/>
+            </a:endParaRPr>
           </a:p>
         </p:txBody>
       </p:sp>
@@ -7438,14 +7466,14 @@
             <a:pPr lvl="1"/>
             <a:r>
               <a:rPr lang="en-US" sz="1400" dirty="0"/>
-              <a:t>Enables a workflow flow of:</a:t>
+              <a:t>The console enables a workflow flow of:</a:t>
             </a:r>
           </a:p>
           <a:p>
             <a:pPr lvl="2"/>
             <a:r>
               <a:rPr lang="en-US" sz="1400" dirty="0"/>
-              <a:t> Approve Funds – persists “Approved” claims to </a:t>
+              <a:t> Approve Tasks – (”Approved” tasks result in creation of  “Approved” claims in </a:t>
             </a:r>
             <a:r>
               <a:rPr lang="en-US" sz="1400" dirty="0" err="1"/>
@@ -7457,19 +7485,7 @@
             <a:pPr lvl="2"/>
             <a:r>
               <a:rPr lang="en-US" sz="1400" dirty="0"/>
-              <a:t>Distribute Funds – persists “Distributed” claims to </a:t>
-            </a:r>
-            <a:r>
-              <a:rPr lang="en-US" sz="1400" dirty="0" err="1"/>
-              <a:t>composeDB</a:t>
-            </a:r>
-            <a:endParaRPr lang="en-US" sz="1400" dirty="0"/>
-          </a:p>
-          <a:p>
-            <a:pPr lvl="2"/>
-            <a:r>
-              <a:rPr lang="en-US" sz="1400" dirty="0"/>
-              <a:t>Submit for Payment – 1) retrieves “Approved” and “Distributed” claims from </a:t>
+              <a:t>Distribute Funds for the completed task to the award recipient (”Earned” tasks result in creation of “Earned” claim in </a:t>
             </a:r>
             <a:r>
               <a:rPr lang="en-US" sz="1400" dirty="0" err="1"/>
@@ -7477,13 +7493,55 @@
             </a:r>
             <a:r>
               <a:rPr lang="en-US" sz="1400" dirty="0"/>
-              <a:t>, 2) persists claims to web3.storage 3) Initiates Bacalhau compute using web3.storage CID.</a:t>
+              <a:t>)</a:t>
+            </a:r>
+          </a:p>
+          <a:p>
+            <a:pPr lvl="2"/>
+            <a:r>
+              <a:rPr lang="en-US" sz="1400" dirty="0"/>
+              <a:t>Submit for Payment:</a:t>
+            </a:r>
+          </a:p>
+          <a:p>
+            <a:pPr marL="1714500" lvl="3" indent="-342900">
+              <a:buFont typeface="+mj-lt"/>
+              <a:buAutoNum type="arabicPeriod"/>
+            </a:pPr>
+            <a:r>
+              <a:rPr lang="en-US" sz="1200" dirty="0"/>
+              <a:t>Retrieves “Approved” and “Distributed” claims from </a:t>
+            </a:r>
+            <a:r>
+              <a:rPr lang="en-US" sz="1200" dirty="0" err="1"/>
+              <a:t>composeDB</a:t>
+            </a:r>
+            <a:endParaRPr lang="en-US" sz="1200" dirty="0"/>
+          </a:p>
+          <a:p>
+            <a:pPr marL="1714500" lvl="3" indent="-342900">
+              <a:buFont typeface="+mj-lt"/>
+              <a:buAutoNum type="arabicPeriod"/>
+            </a:pPr>
+            <a:r>
+              <a:rPr lang="en-US" sz="1200" dirty="0"/>
+              <a:t>Pin claims to web3.storage </a:t>
+            </a:r>
+          </a:p>
+          <a:p>
+            <a:pPr marL="1714500" lvl="3" indent="-342900">
+              <a:buFont typeface="+mj-lt"/>
+              <a:buAutoNum type="arabicPeriod"/>
+            </a:pPr>
+            <a:r>
+              <a:rPr lang="en-US" sz="1200" dirty="0"/>
+              <a:t>Initiate Bacalhau Calc using web3.storage CID.</a:t>
             </a:r>
           </a:p>
           <a:p>
             <a:r>
               <a:rPr lang="en-US" sz="1400" b="1" dirty="0"/>
-              <a:t>Bacalhau Compute {Chris…can you please ensure we have the right bullets here}</a:t>
+              <a:t>Bacalhau Calc</a:t>
             </a:r>
             <a:endParaRPr lang="en-US" sz="1400" dirty="0"/>
           </a:p>
@@ -7491,7 +7549,7 @@
             <a:pPr lvl="1"/>
             <a:r>
               <a:rPr lang="en-US" sz="1400" dirty="0"/>
-              <a:t>Receives the CID for the claims persisted to web3.storage</a:t>
+              <a:t>Receives the CID for the claims pinned to web3.storage</a:t>
             </a:r>
           </a:p>
           <a:p>
@@ -7511,15 +7569,7 @@
           <a:p>
             <a:r>
               <a:rPr lang="en-US" sz="1400" b="1" dirty="0"/>
-              <a:t>Wrapper Contract {</a:t>
-            </a:r>
-            <a:r>
-              <a:rPr lang="en-US" sz="1400" b="1" dirty="0" err="1"/>
-              <a:t>Kartekeya</a:t>
-            </a:r>
-            <a:r>
-              <a:rPr lang="en-US" sz="1400" b="1" dirty="0"/>
-              <a:t> can you please put the right bullets here}</a:t>
+              <a:t>Wrapper Contract</a:t>
             </a:r>
           </a:p>
           <a:p>
@@ -7981,45 +8031,39 @@
               <a:buNone/>
             </a:pPr>
             <a:r>
-              <a:rPr lang="en-US" sz="2000"/>
+              <a:rPr lang="en-US" sz="2000" dirty="0"/>
               <a:t>Each of the components within this solution offers opportunities for reusability.  The following outlines each component's current level of reusability and opportunities for improving future reusability.</a:t>
             </a:r>
           </a:p>
           <a:p>
             <a:r>
-              <a:rPr lang="en-US" sz="2000"/>
+              <a:rPr lang="en-US" sz="2000" dirty="0"/>
               <a:t>IE Console – the sources for the data fed into the evaluator for each round can be a pluggable component.  The POC is implemented with Taiga as the source of the data, but additional sources can be added.  The pluggable component would simply be an extract of the source data and a mapping to the standard claim model. </a:t>
             </a:r>
             <a:r>
-              <a:rPr lang="en-US" sz="2000" i="1"/>
+              <a:rPr lang="en-US" sz="2000" i="1" dirty="0"/>
               <a:t>{Sami….please help with wording}</a:t>
             </a:r>
           </a:p>
           <a:p>
             <a:r>
-              <a:rPr lang="en-US" sz="2000"/>
+              <a:rPr lang="en-US" sz="2000" dirty="0"/>
               <a:t>Bacalhau – The compute component can be made a pluggable component allowing the implementor to customize the rules of the calculation. </a:t>
             </a:r>
+            <a:endParaRPr lang="en-US" sz="2000" i="1" dirty="0"/>
+          </a:p>
+          <a:p>
             <a:r>
-              <a:rPr lang="en-US" sz="2000" i="1"/>
-              <a:t>{Chris…please help with the wording}</a:t>
+              <a:rPr lang="en-US" sz="2000" dirty="0"/>
+              <a:t>Wrapper Contract – The wrapper can support any ERC20 token. </a:t>
             </a:r>
-          </a:p>
-          <a:p>
-            <a:r>
-              <a:rPr lang="en-US" sz="2000"/>
-              <a:t>Wrapper Contract – The wrapper can easily support any ERC20 token. </a:t>
-            </a:r>
-            <a:r>
-              <a:rPr lang="en-US" sz="2000" i="1"/>
-              <a:t>{Kartekeya….please help with wording}</a:t>
-            </a:r>
+            <a:endParaRPr lang="en-US" sz="2000" i="1" dirty="0"/>
           </a:p>
           <a:p>
             <a:pPr marL="0" indent="0">
               <a:buNone/>
             </a:pPr>
-            <a:endParaRPr lang="en-US" sz="2000"/>
+            <a:endParaRPr lang="en-US" sz="2000" dirty="0"/>
           </a:p>
         </p:txBody>
       </p:sp>
@@ -9679,7 +9723,7 @@
         </p:nvGrpSpPr>
         <p:grpSpPr>
           <a:xfrm>
-            <a:off x="4556726" y="4668627"/>
+            <a:off x="3085087" y="4689635"/>
             <a:ext cx="6520160" cy="1656677"/>
             <a:chOff x="4003551" y="4797911"/>
             <a:chExt cx="6520160" cy="1656677"/>
@@ -12842,7 +12886,7 @@
         </p:nvGrpSpPr>
         <p:grpSpPr>
           <a:xfrm>
-            <a:off x="3280582" y="5051614"/>
+            <a:off x="1747101" y="5036066"/>
             <a:ext cx="688489" cy="788919"/>
             <a:chOff x="5056095" y="4819426"/>
             <a:chExt cx="1154656" cy="1262256"/>
@@ -12977,9 +13021,9 @@
           <p:nvPr/>
         </p:nvCxnSpPr>
         <p:spPr>
-          <a:xfrm rot="16200000" flipV="1">
-            <a:off x="2759233" y="4193504"/>
-            <a:ext cx="919284" cy="796935"/>
+          <a:xfrm rot="5400000" flipH="1" flipV="1">
+            <a:off x="2000266" y="4215925"/>
+            <a:ext cx="903736" cy="736546"/>
           </a:xfrm>
           <a:prstGeom prst="curvedConnector3">
             <a:avLst>
@@ -13325,6 +13369,161 @@
           </a:fontRef>
         </p:style>
       </p:cxnSp>
+      <p:grpSp>
+        <p:nvGrpSpPr>
+          <p:cNvPr id="81" name="Group 80">
+            <a:extLst>
+              <a:ext uri="{FF2B5EF4-FFF2-40B4-BE49-F238E27FC236}">
+                <a16:creationId xmlns:a16="http://schemas.microsoft.com/office/drawing/2014/main" id="{432B8547-7EAA-9C42-A541-84EFA40D00AB}"/>
+              </a:ext>
+            </a:extLst>
+          </p:cNvPr>
+          <p:cNvGrpSpPr/>
+          <p:nvPr/>
+        </p:nvGrpSpPr>
+        <p:grpSpPr>
+          <a:xfrm>
+            <a:off x="10482120" y="4826060"/>
+            <a:ext cx="941807" cy="795460"/>
+            <a:chOff x="8782382" y="-110290"/>
+            <a:chExt cx="941807" cy="795460"/>
+          </a:xfrm>
+        </p:grpSpPr>
+        <p:pic>
+          <p:nvPicPr>
+            <p:cNvPr id="82" name="Picture 81" descr="Icon&#10;&#10;Description automatically generated">
+              <a:extLst>
+                <a:ext uri="{FF2B5EF4-FFF2-40B4-BE49-F238E27FC236}">
+                  <a16:creationId xmlns:a16="http://schemas.microsoft.com/office/drawing/2014/main" id="{D23DE90A-98EB-9F44-B919-AD3C958649A2}"/>
+                </a:ext>
+              </a:extLst>
+            </p:cNvPr>
+            <p:cNvPicPr>
+              <a:picLocks noChangeAspect="1"/>
+            </p:cNvPicPr>
+            <p:nvPr/>
+          </p:nvPicPr>
+          <p:blipFill>
+            <a:blip r:embed="rId3"/>
+            <a:stretch>
+              <a:fillRect/>
+            </a:stretch>
+          </p:blipFill>
+          <p:spPr>
+            <a:xfrm>
+              <a:off x="9024635" y="241411"/>
+              <a:ext cx="548640" cy="443759"/>
+            </a:xfrm>
+            <a:prstGeom prst="rect">
+              <a:avLst/>
+            </a:prstGeom>
+          </p:spPr>
+        </p:pic>
+        <p:sp>
+          <p:nvSpPr>
+            <p:cNvPr id="83" name="Rounded Rectangle 82">
+              <a:extLst>
+                <a:ext uri="{FF2B5EF4-FFF2-40B4-BE49-F238E27FC236}">
+                  <a16:creationId xmlns:a16="http://schemas.microsoft.com/office/drawing/2014/main" id="{BCE8B6DB-282C-E145-8EF7-0C9590308528}"/>
+                </a:ext>
+              </a:extLst>
+            </p:cNvPr>
+            <p:cNvSpPr/>
+            <p:nvPr/>
+          </p:nvSpPr>
+          <p:spPr>
+            <a:xfrm>
+              <a:off x="8782382" y="-110290"/>
+              <a:ext cx="941807" cy="410896"/>
+            </a:xfrm>
+            <a:prstGeom prst="roundRect">
+              <a:avLst/>
+            </a:prstGeom>
+            <a:noFill/>
+            <a:ln>
+              <a:solidFill>
+                <a:schemeClr val="accent1"/>
+              </a:solidFill>
+            </a:ln>
+          </p:spPr>
+          <p:style>
+            <a:lnRef idx="2">
+              <a:schemeClr val="accent1">
+                <a:shade val="50000"/>
+              </a:schemeClr>
+            </a:lnRef>
+            <a:fillRef idx="1">
+              <a:schemeClr val="accent1"/>
+            </a:fillRef>
+            <a:effectRef idx="0">
+              <a:schemeClr val="accent1"/>
+            </a:effectRef>
+            <a:fontRef idx="minor">
+              <a:schemeClr val="lt1"/>
+            </a:fontRef>
+          </p:style>
+          <p:txBody>
+            <a:bodyPr rtlCol="0" anchor="ctr"/>
+            <a:lstStyle/>
+            <a:p>
+              <a:pPr algn="ctr"/>
+              <a:r>
+                <a:rPr lang="en-US" sz="1200" dirty="0">
+                  <a:solidFill>
+                    <a:schemeClr val="tx1"/>
+                  </a:solidFill>
+                </a:rPr>
+                <a:t>User Wallets</a:t>
+              </a:r>
+            </a:p>
+          </p:txBody>
+        </p:sp>
+      </p:grpSp>
+      <p:cxnSp>
+        <p:nvCxnSpPr>
+          <p:cNvPr id="84" name="Curved Connector 83">
+            <a:extLst>
+              <a:ext uri="{FF2B5EF4-FFF2-40B4-BE49-F238E27FC236}">
+                <a16:creationId xmlns:a16="http://schemas.microsoft.com/office/drawing/2014/main" id="{E81032A7-EFD1-AF45-9A15-3879A9C3B59A}"/>
+              </a:ext>
+            </a:extLst>
+          </p:cNvPr>
+          <p:cNvCxnSpPr>
+            <a:cxnSpLocks/>
+            <a:stCxn id="73" idx="2"/>
+            <a:endCxn id="83" idx="0"/>
+          </p:cNvCxnSpPr>
+          <p:nvPr/>
+        </p:nvCxnSpPr>
+        <p:spPr>
+          <a:xfrm rot="5400000">
+            <a:off x="10617116" y="4117294"/>
+            <a:ext cx="1044675" cy="372857"/>
+          </a:xfrm>
+          <a:prstGeom prst="curvedConnector3">
+            <a:avLst>
+              <a:gd name="adj1" fmla="val 50000"/>
+            </a:avLst>
+          </a:prstGeom>
+          <a:ln>
+            <a:tailEnd type="triangle"/>
+          </a:ln>
+        </p:spPr>
+        <p:style>
+          <a:lnRef idx="1">
+            <a:schemeClr val="accent1"/>
+          </a:lnRef>
+          <a:fillRef idx="0">
+            <a:schemeClr val="accent1"/>
+          </a:fillRef>
+          <a:effectRef idx="0">
+            <a:schemeClr val="accent1"/>
+          </a:effectRef>
+          <a:fontRef idx="minor">
+            <a:schemeClr val="tx1"/>
+          </a:fontRef>
+        </p:style>
+      </p:cxnSp>
     </p:spTree>
     <p:extLst>
       <p:ext uri="{BB962C8B-B14F-4D97-AF65-F5344CB8AC3E}">
@@ -13694,401 +13893,422 @@
           </a:p>
         </p:txBody>
       </p:sp>
-      <p:sp>
-        <p:nvSpPr>
-          <p:cNvPr id="12" name="TextBox 11">
+      <p:grpSp>
+        <p:nvGrpSpPr>
+          <p:cNvPr id="2" name="Group 1">
             <a:extLst>
               <a:ext uri="{FF2B5EF4-FFF2-40B4-BE49-F238E27FC236}">
-                <a16:creationId xmlns:a16="http://schemas.microsoft.com/office/drawing/2014/main" id="{79785AD8-C450-0D4D-96B2-A0F6FC6ECF31}"/>
+                <a16:creationId xmlns:a16="http://schemas.microsoft.com/office/drawing/2014/main" id="{6EC6673F-F10E-284D-BCD5-876111A0EC92}"/>
               </a:ext>
             </a:extLst>
           </p:cNvPr>
-          <p:cNvSpPr txBox="1"/>
+          <p:cNvGrpSpPr/>
           <p:nvPr/>
-        </p:nvSpPr>
-        <p:spPr>
+        </p:nvGrpSpPr>
+        <p:grpSpPr>
           <a:xfrm>
             <a:off x="919027" y="543185"/>
-            <a:ext cx="2412896" cy="383741"/>
+            <a:ext cx="5347303" cy="4922466"/>
+            <a:chOff x="919027" y="543185"/>
+            <a:chExt cx="5347303" cy="4922466"/>
           </a:xfrm>
-          <a:prstGeom prst="rect">
-            <a:avLst/>
-          </a:prstGeom>
-          <a:noFill/>
-          <a:ln w="19050">
+        </p:grpSpPr>
+        <p:sp>
+          <p:nvSpPr>
+            <p:cNvPr id="12" name="TextBox 11">
+              <a:extLst>
+                <a:ext uri="{FF2B5EF4-FFF2-40B4-BE49-F238E27FC236}">
+                  <a16:creationId xmlns:a16="http://schemas.microsoft.com/office/drawing/2014/main" id="{79785AD8-C450-0D4D-96B2-A0F6FC6ECF31}"/>
+                </a:ext>
+              </a:extLst>
+            </p:cNvPr>
+            <p:cNvSpPr txBox="1"/>
+            <p:nvPr/>
+          </p:nvSpPr>
+          <p:spPr>
+            <a:xfrm>
+              <a:off x="919027" y="543185"/>
+              <a:ext cx="2412896" cy="383741"/>
+            </a:xfrm>
+            <a:prstGeom prst="rect">
+              <a:avLst/>
+            </a:prstGeom>
+            <a:noFill/>
+            <a:ln w="19050">
+              <a:solidFill>
+                <a:schemeClr val="accent1"/>
+              </a:solidFill>
+            </a:ln>
+          </p:spPr>
+          <p:txBody>
+            <a:bodyPr wrap="square" rtlCol="0">
+              <a:noAutofit/>
+            </a:bodyPr>
+            <a:lstStyle/>
+            <a:p>
+              <a:pPr algn="ctr"/>
+              <a:r>
+                <a:rPr lang="en-US" dirty="0"/>
+                <a:t>Claim Model</a:t>
+              </a:r>
+              <a:endParaRPr lang="en-US" sz="1600" dirty="0"/>
+            </a:p>
+          </p:txBody>
+        </p:sp>
+        <p:sp>
+          <p:nvSpPr>
+            <p:cNvPr id="17" name="TextBox 16">
+              <a:extLst>
+                <a:ext uri="{FF2B5EF4-FFF2-40B4-BE49-F238E27FC236}">
+                  <a16:creationId xmlns:a16="http://schemas.microsoft.com/office/drawing/2014/main" id="{525DE2EF-D77B-FD4E-A838-F8479BC65E2A}"/>
+                </a:ext>
+              </a:extLst>
+            </p:cNvPr>
+            <p:cNvSpPr txBox="1"/>
+            <p:nvPr/>
+          </p:nvSpPr>
+          <p:spPr>
+            <a:xfrm>
+              <a:off x="927378" y="926926"/>
+              <a:ext cx="4881751" cy="3288459"/>
+            </a:xfrm>
+            <a:prstGeom prst="rect">
+              <a:avLst/>
+            </a:prstGeom>
             <a:solidFill>
               <a:schemeClr val="accent1"/>
             </a:solidFill>
-          </a:ln>
-        </p:spPr>
-        <p:txBody>
-          <a:bodyPr wrap="square" rtlCol="0">
-            <a:noAutofit/>
-          </a:bodyPr>
-          <a:lstStyle/>
-          <a:p>
-            <a:pPr algn="ctr"/>
-            <a:r>
-              <a:rPr lang="en-US" dirty="0"/>
-              <a:t>Claim Model</a:t>
-            </a:r>
-            <a:endParaRPr lang="en-US" sz="1600" dirty="0"/>
-          </a:p>
-        </p:txBody>
-      </p:sp>
-      <p:sp>
-        <p:nvSpPr>
-          <p:cNvPr id="17" name="TextBox 16">
-            <a:extLst>
-              <a:ext uri="{FF2B5EF4-FFF2-40B4-BE49-F238E27FC236}">
-                <a16:creationId xmlns:a16="http://schemas.microsoft.com/office/drawing/2014/main" id="{525DE2EF-D77B-FD4E-A838-F8479BC65E2A}"/>
-              </a:ext>
-            </a:extLst>
-          </p:cNvPr>
-          <p:cNvSpPr txBox="1"/>
-          <p:nvPr/>
-        </p:nvSpPr>
-        <p:spPr>
-          <a:xfrm>
-            <a:off x="927378" y="926926"/>
-            <a:ext cx="9539954" cy="3288459"/>
-          </a:xfrm>
-          <a:prstGeom prst="rect">
-            <a:avLst/>
-          </a:prstGeom>
-          <a:solidFill>
-            <a:schemeClr val="accent1"/>
-          </a:solidFill>
-          <a:ln w="19050">
+            <a:ln w="19050">
+              <a:solidFill>
+                <a:schemeClr val="accent1"/>
+              </a:solidFill>
+            </a:ln>
+          </p:spPr>
+          <p:txBody>
+            <a:bodyPr wrap="square" lIns="0" tIns="0" rIns="0" bIns="0" rtlCol="0" anchor="t">
+              <a:noAutofit/>
+            </a:bodyPr>
+            <a:lstStyle/>
+            <a:p>
+              <a:pPr algn="ctr"/>
+              <a:endParaRPr lang="en-US" dirty="0">
+                <a:solidFill>
+                  <a:schemeClr val="bg1"/>
+                </a:solidFill>
+              </a:endParaRPr>
+            </a:p>
+          </p:txBody>
+        </p:sp>
+        <p:sp>
+          <p:nvSpPr>
+            <p:cNvPr id="18" name="TextBox 17">
+              <a:extLst>
+                <a:ext uri="{FF2B5EF4-FFF2-40B4-BE49-F238E27FC236}">
+                  <a16:creationId xmlns:a16="http://schemas.microsoft.com/office/drawing/2014/main" id="{1B4CA7F7-B173-624C-9DD6-3A3C01BEFD4D}"/>
+                </a:ext>
+              </a:extLst>
+            </p:cNvPr>
+            <p:cNvSpPr txBox="1"/>
+            <p:nvPr/>
+          </p:nvSpPr>
+          <p:spPr>
+            <a:xfrm>
+              <a:off x="927378" y="1202586"/>
+              <a:ext cx="4881751" cy="4233710"/>
+            </a:xfrm>
+            <a:prstGeom prst="rect">
+              <a:avLst/>
+            </a:prstGeom>
             <a:solidFill>
-              <a:schemeClr val="accent1"/>
+              <a:schemeClr val="bg1"/>
             </a:solidFill>
-          </a:ln>
-        </p:spPr>
-        <p:txBody>
-          <a:bodyPr wrap="square" lIns="0" tIns="0" rIns="0" bIns="0" rtlCol="0" anchor="t">
-            <a:noAutofit/>
-          </a:bodyPr>
-          <a:lstStyle/>
-          <a:p>
-            <a:pPr algn="ctr"/>
-            <a:endParaRPr lang="en-US" dirty="0">
+            <a:ln w="19050">
               <a:solidFill>
-                <a:schemeClr val="bg1"/>
+                <a:schemeClr val="accent1"/>
               </a:solidFill>
-            </a:endParaRPr>
-          </a:p>
-        </p:txBody>
-      </p:sp>
-      <p:sp>
-        <p:nvSpPr>
-          <p:cNvPr id="18" name="TextBox 17">
-            <a:extLst>
-              <a:ext uri="{FF2B5EF4-FFF2-40B4-BE49-F238E27FC236}">
-                <a16:creationId xmlns:a16="http://schemas.microsoft.com/office/drawing/2014/main" id="{1B4CA7F7-B173-624C-9DD6-3A3C01BEFD4D}"/>
-              </a:ext>
-            </a:extLst>
-          </p:cNvPr>
-          <p:cNvSpPr txBox="1"/>
-          <p:nvPr/>
-        </p:nvSpPr>
-        <p:spPr>
-          <a:xfrm>
-            <a:off x="927378" y="1202586"/>
-            <a:ext cx="9545951" cy="4233710"/>
-          </a:xfrm>
-          <a:prstGeom prst="rect">
-            <a:avLst/>
-          </a:prstGeom>
-          <a:solidFill>
-            <a:schemeClr val="bg1"/>
-          </a:solidFill>
-          <a:ln w="19050">
-            <a:solidFill>
-              <a:schemeClr val="accent1"/>
-            </a:solidFill>
-          </a:ln>
-        </p:spPr>
-        <p:txBody>
-          <a:bodyPr wrap="square" rtlCol="0" anchor="ctr">
-            <a:noAutofit/>
-          </a:bodyPr>
-          <a:lstStyle/>
-          <a:p>
-            <a:pPr algn="ctr"/>
-            <a:endParaRPr lang="en-US" dirty="0"/>
-          </a:p>
-        </p:txBody>
-      </p:sp>
-      <p:sp>
-        <p:nvSpPr>
-          <p:cNvPr id="19" name="TextBox 18">
-            <a:extLst>
-              <a:ext uri="{FF2B5EF4-FFF2-40B4-BE49-F238E27FC236}">
-                <a16:creationId xmlns:a16="http://schemas.microsoft.com/office/drawing/2014/main" id="{A3D36708-6141-4949-BD3E-DAA62D557CD5}"/>
-              </a:ext>
-            </a:extLst>
-          </p:cNvPr>
-          <p:cNvSpPr txBox="1"/>
-          <p:nvPr/>
-        </p:nvSpPr>
-        <p:spPr>
-          <a:xfrm>
-            <a:off x="1718671" y="1310667"/>
-            <a:ext cx="8176891" cy="4154984"/>
-          </a:xfrm>
-          <a:prstGeom prst="rect">
-            <a:avLst/>
-          </a:prstGeom>
-          <a:noFill/>
-        </p:spPr>
-        <p:txBody>
-          <a:bodyPr wrap="square" rtlCol="0">
-            <a:spAutoFit/>
-          </a:bodyPr>
-          <a:lstStyle/>
-          <a:p>
-            <a:r>
-              <a:rPr lang="en-US" sz="1100" b="0" dirty="0">
+            </a:ln>
+          </p:spPr>
+          <p:txBody>
+            <a:bodyPr wrap="square" rtlCol="0" anchor="ctr">
+              <a:noAutofit/>
+            </a:bodyPr>
+            <a:lstStyle/>
+            <a:p>
+              <a:pPr algn="ctr"/>
+              <a:endParaRPr lang="en-US" dirty="0"/>
+            </a:p>
+          </p:txBody>
+        </p:sp>
+        <p:sp>
+          <p:nvSpPr>
+            <p:cNvPr id="19" name="TextBox 18">
+              <a:extLst>
+                <a:ext uri="{FF2B5EF4-FFF2-40B4-BE49-F238E27FC236}">
+                  <a16:creationId xmlns:a16="http://schemas.microsoft.com/office/drawing/2014/main" id="{A3D36708-6141-4949-BD3E-DAA62D557CD5}"/>
+                </a:ext>
+              </a:extLst>
+            </p:cNvPr>
+            <p:cNvSpPr txBox="1"/>
+            <p:nvPr/>
+          </p:nvSpPr>
+          <p:spPr>
+            <a:xfrm>
+              <a:off x="1718672" y="1310667"/>
+              <a:ext cx="4547658" cy="4154984"/>
+            </a:xfrm>
+            <a:prstGeom prst="rect">
+              <a:avLst/>
+            </a:prstGeom>
+            <a:noFill/>
+          </p:spPr>
+          <p:txBody>
+            <a:bodyPr wrap="square" rtlCol="0">
+              <a:spAutoFit/>
+            </a:bodyPr>
+            <a:lstStyle/>
+            <a:p>
+              <a:r>
+                <a:rPr lang="en-US" sz="1100" b="0" dirty="0">
+                  <a:effectLst/>
+                </a:rPr>
+                <a:t>type </a:t>
+              </a:r>
+              <a:r>
+                <a:rPr lang="en-US" sz="1100" b="0" dirty="0" err="1">
+                  <a:effectLst/>
+                </a:rPr>
+                <a:t>IEClaim</a:t>
+              </a:r>
+              <a:endParaRPr lang="en-US" sz="1100" b="0" dirty="0">
                 <a:effectLst/>
-              </a:rPr>
-              <a:t>type </a:t>
-            </a:r>
-            <a:r>
-              <a:rPr lang="en-US" sz="1100" b="0" dirty="0" err="1">
+              </a:endParaRPr>
+            </a:p>
+            <a:p>
+              <a:r>
+                <a:rPr lang="en-US" sz="1100" b="0" dirty="0">
+                  <a:effectLst/>
+                </a:rPr>
+                <a:t>@createModel(</a:t>
+              </a:r>
+            </a:p>
+            <a:p>
+              <a:r>
+                <a:rPr lang="en-US" sz="1100" b="0" dirty="0">
+                  <a:effectLst/>
+                </a:rPr>
+                <a:t>accountRelation: LIST</a:t>
+              </a:r>
+            </a:p>
+            <a:p>
+              <a:r>
+                <a:rPr lang="en-US" sz="1100" b="0" dirty="0">
+                  <a:effectLst/>
+                </a:rPr>
+                <a:t>description: "Claim or attestation, possibly from 3rd party sources"</a:t>
+              </a:r>
+            </a:p>
+            <a:p>
+              <a:r>
+                <a:rPr lang="en-US" sz="1100" b="0" dirty="0">
+                  <a:effectLst/>
+                </a:rPr>
+                <a:t>) {</a:t>
+              </a:r>
+            </a:p>
+            <a:p>
+              <a:r>
+                <a:rPr lang="en-US" sz="1100" b="0" dirty="0">
+                  <a:effectLst/>
+                </a:rPr>
+                <a:t>subject: String @string(minLength: 1, maxLength: 256)</a:t>
+              </a:r>
+            </a:p>
+            <a:p>
+              <a:r>
+                <a:rPr lang="en-US" sz="1100" b="0" dirty="0">
+                  <a:effectLst/>
+                </a:rPr>
+                <a:t>claim: String @string(minLength: 1, maxLength: 1024)</a:t>
+              </a:r>
+            </a:p>
+            <a:p>
+              <a:r>
+                <a:rPr lang="en-US" sz="1100" b="0" dirty="0" err="1">
+                  <a:effectLst/>
+                </a:rPr>
+                <a:t>root_claim_id</a:t>
+              </a:r>
+              <a:r>
+                <a:rPr lang="en-US" sz="1100" b="0" dirty="0">
+                  <a:effectLst/>
+                </a:rPr>
+                <a:t>: String @string(minLength: 1, maxLength: 1024)</a:t>
+              </a:r>
+            </a:p>
+            <a:p>
+              <a:r>
+                <a:rPr lang="en-US" sz="1100" dirty="0"/>
+                <a:t>round: String @string(minLength: xx, maxLength: xx)</a:t>
+              </a:r>
+              <a:endParaRPr lang="en-US" sz="1100" b="0" dirty="0">
                 <a:effectLst/>
-              </a:rPr>
-              <a:t>IEClaim</a:t>
-            </a:r>
-            <a:endParaRPr lang="en-US" sz="1100" b="0" dirty="0">
-              <a:effectLst/>
-            </a:endParaRPr>
-          </a:p>
-          <a:p>
-            <a:r>
-              <a:rPr lang="en-US" sz="1100" b="0" dirty="0">
+              </a:endParaRPr>
+            </a:p>
+            <a:p>
+              <a:r>
+                <a:rPr lang="en-US" sz="1100" b="0" dirty="0">
+                  <a:effectLst/>
+                </a:rPr>
+                <a:t>amount: Int</a:t>
+              </a:r>
+            </a:p>
+            <a:p>
+              <a:r>
+                <a:rPr lang="en-US" sz="1100" b="0" dirty="0" err="1">
+                  <a:effectLst/>
+                </a:rPr>
+                <a:t>amountUnits</a:t>
+              </a:r>
+              <a:r>
+                <a:rPr lang="en-US" sz="1100" b="0" dirty="0">
+                  <a:effectLst/>
+                </a:rPr>
+                <a:t>: String @string(minLength: 1, maxLength: 16)</a:t>
+              </a:r>
+            </a:p>
+            <a:p>
+              <a:r>
+                <a:rPr lang="en-US" sz="1100" dirty="0"/>
+                <a:t>isSatisfied: Boolean @</a:t>
+              </a:r>
+              <a:r>
+                <a:rPr lang="en-US" sz="1100" dirty="0" err="1"/>
+                <a:t>boolean</a:t>
+              </a:r>
+              <a:endParaRPr lang="en-US" sz="1100" b="0" dirty="0">
                 <a:effectLst/>
-              </a:rPr>
-              <a:t>@createModel(</a:t>
-            </a:r>
-          </a:p>
-          <a:p>
-            <a:r>
-              <a:rPr lang="en-US" sz="1100" b="0" dirty="0">
-                <a:effectLst/>
-              </a:rPr>
-              <a:t>accountRelation: LIST</a:t>
-            </a:r>
-          </a:p>
-          <a:p>
-            <a:r>
-              <a:rPr lang="en-US" sz="1100" b="0" dirty="0">
-                <a:effectLst/>
-              </a:rPr>
-              <a:t>description: "Claim or attestation, possibly from 3rd party sources"</a:t>
-            </a:r>
-          </a:p>
-          <a:p>
-            <a:r>
-              <a:rPr lang="en-US" sz="1100" b="0" dirty="0">
-                <a:effectLst/>
-              </a:rPr>
-              <a:t>) {</a:t>
-            </a:r>
-          </a:p>
-          <a:p>
-            <a:r>
-              <a:rPr lang="en-US" sz="1100" b="0" dirty="0">
-                <a:effectLst/>
-              </a:rPr>
-              <a:t>subject: String @string(minLength: 1, maxLength: 256)</a:t>
-            </a:r>
-          </a:p>
-          <a:p>
-            <a:r>
-              <a:rPr lang="en-US" sz="1100" b="0" dirty="0">
-                <a:effectLst/>
-              </a:rPr>
-              <a:t>claim: String @string(minLength: 1, maxLength: 1024)</a:t>
-            </a:r>
-          </a:p>
-          <a:p>
-            <a:r>
-              <a:rPr lang="en-US" sz="1100" b="0" dirty="0" err="1">
-                <a:effectLst/>
-              </a:rPr>
-              <a:t>root_claim_id</a:t>
-            </a:r>
-            <a:r>
-              <a:rPr lang="en-US" sz="1100" b="0" dirty="0">
-                <a:effectLst/>
-              </a:rPr>
-              <a:t>: String @string(minLength: 1, maxLength: 1024)</a:t>
-            </a:r>
-          </a:p>
-          <a:p>
-            <a:r>
-              <a:rPr lang="en-US" sz="1100" dirty="0"/>
-              <a:t>round: String @string(minLength: xx, maxLength: xx)</a:t>
-            </a:r>
-            <a:endParaRPr lang="en-US" sz="1100" b="0" dirty="0">
-              <a:effectLst/>
-            </a:endParaRPr>
-          </a:p>
-          <a:p>
-            <a:r>
-              <a:rPr lang="en-US" sz="1100" b="0" dirty="0">
-                <a:effectLst/>
-              </a:rPr>
-              <a:t>amount: Int</a:t>
-            </a:r>
-          </a:p>
-          <a:p>
-            <a:r>
-              <a:rPr lang="en-US" sz="1100" b="0" dirty="0" err="1">
-                <a:effectLst/>
-              </a:rPr>
-              <a:t>amountUnits</a:t>
-            </a:r>
-            <a:r>
-              <a:rPr lang="en-US" sz="1100" b="0" dirty="0">
-                <a:effectLst/>
-              </a:rPr>
-              <a:t>: String @string(minLength: 1, maxLength: 16)</a:t>
-            </a:r>
-          </a:p>
-          <a:p>
-            <a:r>
-              <a:rPr lang="en-US" sz="1100" dirty="0"/>
-              <a:t>isSatisfied: Boolean @</a:t>
-            </a:r>
-            <a:r>
-              <a:rPr lang="en-US" sz="1100" dirty="0" err="1"/>
-              <a:t>boolean</a:t>
-            </a:r>
-            <a:endParaRPr lang="en-US" sz="1100" b="0" dirty="0">
-              <a:effectLst/>
-            </a:endParaRPr>
-          </a:p>
-          <a:p>
-            <a:r>
-              <a:rPr lang="en-US" sz="1100" b="0" dirty="0" err="1">
-                <a:effectLst/>
-              </a:rPr>
-              <a:t>effective_date</a:t>
-            </a:r>
-            <a:r>
-              <a:rPr lang="en-US" sz="1100" b="0" dirty="0">
-                <a:effectLst/>
-              </a:rPr>
-              <a:t>: String! @string(minLength: 1, maxLength: 10)</a:t>
-            </a:r>
-          </a:p>
-          <a:p>
-            <a:r>
-              <a:rPr lang="en-US" sz="1100" b="0" dirty="0">
-                <a:effectLst/>
-              </a:rPr>
-              <a:t>statement: String @string(minLength: 1, maxLength: 16384)</a:t>
-            </a:r>
-          </a:p>
-          <a:p>
-            <a:r>
-              <a:rPr lang="en-US" sz="1100" b="0" dirty="0">
-                <a:effectLst/>
-              </a:rPr>
-              <a:t>source: String @string(minLength: 1, maxLength: 1024)</a:t>
-            </a:r>
-          </a:p>
-          <a:p>
-            <a:r>
-              <a:rPr lang="en-US" sz="1100" b="0" dirty="0" err="1">
-                <a:effectLst/>
-              </a:rPr>
-              <a:t>digestMultibase</a:t>
-            </a:r>
-            <a:r>
-              <a:rPr lang="en-US" sz="1100" b="0" dirty="0">
-                <a:effectLst/>
-              </a:rPr>
-              <a:t>: String @string(minLength: 1, maxLength: 256)</a:t>
-            </a:r>
-          </a:p>
-          <a:p>
-            <a:br>
-              <a:rPr lang="en-US" sz="1100" b="0" dirty="0">
-                <a:effectLst/>
-              </a:rPr>
-            </a:br>
-            <a:r>
-              <a:rPr lang="en-US" sz="1100" b="0" dirty="0">
-                <a:effectLst/>
-              </a:rPr>
-              <a:t>aspect: String @string(minLength: 1, maxLength: 256)</a:t>
-            </a:r>
-          </a:p>
-          <a:p>
-            <a:r>
-              <a:rPr lang="en-US" sz="1100" b="0" dirty="0">
-                <a:effectLst/>
-              </a:rPr>
-              <a:t>object: String @string(minLength: 1, maxLength: 1024)</a:t>
-            </a:r>
-          </a:p>
-          <a:p>
-            <a:r>
-              <a:rPr lang="en-US" sz="1100" b="0" dirty="0">
-                <a:effectLst/>
-              </a:rPr>
-              <a:t>confidence: Float @float(min: 0, max: 1)</a:t>
-            </a:r>
-          </a:p>
-          <a:p>
-            <a:r>
-              <a:rPr lang="en-US" sz="1100" b="0" dirty="0">
-                <a:effectLst/>
-              </a:rPr>
-              <a:t>rating: Float @float(min: -1, max: 1)</a:t>
-            </a:r>
-          </a:p>
-          <a:p>
-            <a:r>
-              <a:rPr lang="en-US" sz="1100" b="0" dirty="0" err="1">
-                <a:effectLst/>
-              </a:rPr>
-              <a:t>intendedAudience</a:t>
-            </a:r>
-            <a:r>
-              <a:rPr lang="en-US" sz="1100" b="0" dirty="0">
-                <a:effectLst/>
-              </a:rPr>
-              <a:t>: String @string(minLength: 1, maxLength: 256)</a:t>
-            </a:r>
-          </a:p>
-          <a:p>
-            <a:r>
-              <a:rPr lang="en-US" sz="1100" b="0" dirty="0" err="1">
-                <a:effectLst/>
-              </a:rPr>
-              <a:t>respondAt</a:t>
-            </a:r>
-            <a:r>
-              <a:rPr lang="en-US" sz="1100" b="0" dirty="0">
-                <a:effectLst/>
-              </a:rPr>
-              <a:t>: String @string(minLength: 1, maxLength: 1024)</a:t>
-            </a:r>
-          </a:p>
-          <a:p>
-            <a:r>
-              <a:rPr lang="en-US" sz="1100" b="0" dirty="0">
-                <a:effectLst/>
-              </a:rPr>
-              <a:t>}</a:t>
-            </a:r>
-          </a:p>
-        </p:txBody>
-      </p:sp>
+              </a:endParaRPr>
+            </a:p>
+            <a:p>
+              <a:r>
+                <a:rPr lang="en-US" sz="1100" b="0" dirty="0" err="1">
+                  <a:effectLst/>
+                </a:rPr>
+                <a:t>effective_date</a:t>
+              </a:r>
+              <a:r>
+                <a:rPr lang="en-US" sz="1100" b="0" dirty="0">
+                  <a:effectLst/>
+                </a:rPr>
+                <a:t>: String! @string(minLength: 1, maxLength: 10)</a:t>
+              </a:r>
+            </a:p>
+            <a:p>
+              <a:r>
+                <a:rPr lang="en-US" sz="1100" b="0" dirty="0">
+                  <a:effectLst/>
+                </a:rPr>
+                <a:t>statement: String @string(minLength: 1, maxLength: 16384)</a:t>
+              </a:r>
+            </a:p>
+            <a:p>
+              <a:r>
+                <a:rPr lang="en-US" sz="1100" b="0" dirty="0">
+                  <a:effectLst/>
+                </a:rPr>
+                <a:t>source: String @string(minLength: 1, maxLength: 1024)</a:t>
+              </a:r>
+            </a:p>
+            <a:p>
+              <a:r>
+                <a:rPr lang="en-US" sz="1100" b="0" dirty="0" err="1">
+                  <a:effectLst/>
+                </a:rPr>
+                <a:t>digestMultibase</a:t>
+              </a:r>
+              <a:r>
+                <a:rPr lang="en-US" sz="1100" b="0" dirty="0">
+                  <a:effectLst/>
+                </a:rPr>
+                <a:t>: String @string(minLength: 1, maxLength: 256)</a:t>
+              </a:r>
+            </a:p>
+            <a:p>
+              <a:br>
+                <a:rPr lang="en-US" sz="1100" b="0" dirty="0">
+                  <a:effectLst/>
+                </a:rPr>
+              </a:br>
+              <a:r>
+                <a:rPr lang="en-US" sz="1100" b="0" dirty="0">
+                  <a:effectLst/>
+                </a:rPr>
+                <a:t>aspect: String @string(minLength: 1, maxLength: 256)</a:t>
+              </a:r>
+            </a:p>
+            <a:p>
+              <a:r>
+                <a:rPr lang="en-US" sz="1100" b="0" dirty="0">
+                  <a:effectLst/>
+                </a:rPr>
+                <a:t>object: String @string(minLength: 1, maxLength: 1024)</a:t>
+              </a:r>
+            </a:p>
+            <a:p>
+              <a:r>
+                <a:rPr lang="en-US" sz="1100" b="0" dirty="0">
+                  <a:effectLst/>
+                </a:rPr>
+                <a:t>confidence: Float @float(min: 0, max: 1)</a:t>
+              </a:r>
+            </a:p>
+            <a:p>
+              <a:r>
+                <a:rPr lang="en-US" sz="1100" b="0" dirty="0">
+                  <a:effectLst/>
+                </a:rPr>
+                <a:t>rating: Float @float(min: -1, max: 1)</a:t>
+              </a:r>
+            </a:p>
+            <a:p>
+              <a:r>
+                <a:rPr lang="en-US" sz="1100" b="0" dirty="0" err="1">
+                  <a:effectLst/>
+                </a:rPr>
+                <a:t>intendedAudience</a:t>
+              </a:r>
+              <a:r>
+                <a:rPr lang="en-US" sz="1100" b="0" dirty="0">
+                  <a:effectLst/>
+                </a:rPr>
+                <a:t>: String @string(minLength: 1, maxLength: 256)</a:t>
+              </a:r>
+            </a:p>
+            <a:p>
+              <a:r>
+                <a:rPr lang="en-US" sz="1100" b="0" dirty="0" err="1">
+                  <a:effectLst/>
+                </a:rPr>
+                <a:t>respondAt</a:t>
+              </a:r>
+              <a:r>
+                <a:rPr lang="en-US" sz="1100" b="0" dirty="0">
+                  <a:effectLst/>
+                </a:rPr>
+                <a:t>: String @string(minLength: 1, maxLength: 1024)</a:t>
+              </a:r>
+            </a:p>
+            <a:p>
+              <a:r>
+                <a:rPr lang="en-US" sz="1100" b="0" dirty="0">
+                  <a:effectLst/>
+                </a:rPr>
+                <a:t>}</a:t>
+              </a:r>
+            </a:p>
+          </p:txBody>
+        </p:sp>
+      </p:grpSp>
       <p:sp>
         <p:nvSpPr>
           <p:cNvPr id="20" name="TextBox 19">
@@ -14144,6 +14364,194 @@
           </a:p>
         </p:txBody>
       </p:sp>
+      <p:grpSp>
+        <p:nvGrpSpPr>
+          <p:cNvPr id="13" name="Group 12">
+            <a:extLst>
+              <a:ext uri="{FF2B5EF4-FFF2-40B4-BE49-F238E27FC236}">
+                <a16:creationId xmlns:a16="http://schemas.microsoft.com/office/drawing/2014/main" id="{59C2A265-BA54-174B-8793-F2DFC6866B81}"/>
+              </a:ext>
+            </a:extLst>
+          </p:cNvPr>
+          <p:cNvGrpSpPr/>
+          <p:nvPr/>
+        </p:nvGrpSpPr>
+        <p:grpSpPr>
+          <a:xfrm>
+            <a:off x="6123899" y="513830"/>
+            <a:ext cx="4890102" cy="4893111"/>
+            <a:chOff x="919027" y="543185"/>
+            <a:chExt cx="4890102" cy="4893111"/>
+          </a:xfrm>
+        </p:grpSpPr>
+        <p:sp>
+          <p:nvSpPr>
+            <p:cNvPr id="14" name="TextBox 13">
+              <a:extLst>
+                <a:ext uri="{FF2B5EF4-FFF2-40B4-BE49-F238E27FC236}">
+                  <a16:creationId xmlns:a16="http://schemas.microsoft.com/office/drawing/2014/main" id="{F8171866-9336-454E-ABB3-2B21B50D9995}"/>
+                </a:ext>
+              </a:extLst>
+            </p:cNvPr>
+            <p:cNvSpPr txBox="1"/>
+            <p:nvPr/>
+          </p:nvSpPr>
+          <p:spPr>
+            <a:xfrm>
+              <a:off x="919027" y="543185"/>
+              <a:ext cx="2412896" cy="383741"/>
+            </a:xfrm>
+            <a:prstGeom prst="rect">
+              <a:avLst/>
+            </a:prstGeom>
+            <a:noFill/>
+            <a:ln w="19050">
+              <a:solidFill>
+                <a:schemeClr val="accent1"/>
+              </a:solidFill>
+            </a:ln>
+          </p:spPr>
+          <p:txBody>
+            <a:bodyPr wrap="square" rtlCol="0">
+              <a:noAutofit/>
+            </a:bodyPr>
+            <a:lstStyle/>
+            <a:p>
+              <a:pPr algn="ctr"/>
+              <a:r>
+                <a:rPr lang="en-US" dirty="0"/>
+                <a:t>Resources</a:t>
+              </a:r>
+              <a:endParaRPr lang="en-US" sz="1600" dirty="0"/>
+            </a:p>
+          </p:txBody>
+        </p:sp>
+        <p:sp>
+          <p:nvSpPr>
+            <p:cNvPr id="15" name="TextBox 14">
+              <a:extLst>
+                <a:ext uri="{FF2B5EF4-FFF2-40B4-BE49-F238E27FC236}">
+                  <a16:creationId xmlns:a16="http://schemas.microsoft.com/office/drawing/2014/main" id="{FCE06FEF-3D49-7848-80F5-4DC373215C94}"/>
+                </a:ext>
+              </a:extLst>
+            </p:cNvPr>
+            <p:cNvSpPr txBox="1"/>
+            <p:nvPr/>
+          </p:nvSpPr>
+          <p:spPr>
+            <a:xfrm>
+              <a:off x="927378" y="926926"/>
+              <a:ext cx="4881751" cy="3288459"/>
+            </a:xfrm>
+            <a:prstGeom prst="rect">
+              <a:avLst/>
+            </a:prstGeom>
+            <a:solidFill>
+              <a:schemeClr val="accent1"/>
+            </a:solidFill>
+            <a:ln w="19050">
+              <a:solidFill>
+                <a:schemeClr val="accent1"/>
+              </a:solidFill>
+            </a:ln>
+          </p:spPr>
+          <p:txBody>
+            <a:bodyPr wrap="square" lIns="0" tIns="0" rIns="0" bIns="0" rtlCol="0" anchor="t">
+              <a:noAutofit/>
+            </a:bodyPr>
+            <a:lstStyle/>
+            <a:p>
+              <a:pPr algn="ctr"/>
+              <a:endParaRPr lang="en-US" dirty="0">
+                <a:solidFill>
+                  <a:schemeClr val="bg1"/>
+                </a:solidFill>
+              </a:endParaRPr>
+            </a:p>
+          </p:txBody>
+        </p:sp>
+        <p:sp>
+          <p:nvSpPr>
+            <p:cNvPr id="16" name="TextBox 15">
+              <a:extLst>
+                <a:ext uri="{FF2B5EF4-FFF2-40B4-BE49-F238E27FC236}">
+                  <a16:creationId xmlns:a16="http://schemas.microsoft.com/office/drawing/2014/main" id="{A69D0315-DAE7-5F4D-AFC1-268F1FA4ED6E}"/>
+                </a:ext>
+              </a:extLst>
+            </p:cNvPr>
+            <p:cNvSpPr txBox="1"/>
+            <p:nvPr/>
+          </p:nvSpPr>
+          <p:spPr>
+            <a:xfrm>
+              <a:off x="927378" y="1202586"/>
+              <a:ext cx="4881751" cy="4233710"/>
+            </a:xfrm>
+            <a:prstGeom prst="rect">
+              <a:avLst/>
+            </a:prstGeom>
+            <a:solidFill>
+              <a:schemeClr val="bg1"/>
+            </a:solidFill>
+            <a:ln w="19050">
+              <a:solidFill>
+                <a:schemeClr val="accent1"/>
+              </a:solidFill>
+            </a:ln>
+          </p:spPr>
+          <p:txBody>
+            <a:bodyPr wrap="square" rtlCol="0" anchor="ctr">
+              <a:noAutofit/>
+            </a:bodyPr>
+            <a:lstStyle/>
+            <a:p>
+              <a:pPr algn="ctr"/>
+              <a:endParaRPr lang="en-US" dirty="0"/>
+            </a:p>
+          </p:txBody>
+        </p:sp>
+        <p:sp>
+          <p:nvSpPr>
+            <p:cNvPr id="21" name="TextBox 20">
+              <a:extLst>
+                <a:ext uri="{FF2B5EF4-FFF2-40B4-BE49-F238E27FC236}">
+                  <a16:creationId xmlns:a16="http://schemas.microsoft.com/office/drawing/2014/main" id="{B71E74F4-60A6-5148-9928-31EE78AE0876}"/>
+                </a:ext>
+              </a:extLst>
+            </p:cNvPr>
+            <p:cNvSpPr txBox="1"/>
+            <p:nvPr/>
+          </p:nvSpPr>
+          <p:spPr>
+            <a:xfrm>
+              <a:off x="1004878" y="1315017"/>
+              <a:ext cx="4547658" cy="261610"/>
+            </a:xfrm>
+            <a:prstGeom prst="rect">
+              <a:avLst/>
+            </a:prstGeom>
+            <a:noFill/>
+          </p:spPr>
+          <p:txBody>
+            <a:bodyPr wrap="square" rtlCol="0">
+              <a:spAutoFit/>
+            </a:bodyPr>
+            <a:lstStyle/>
+            <a:p>
+              <a:r>
+                <a:rPr lang="en-US" sz="1100" b="0" dirty="0">
+                  <a:effectLst/>
+                  <a:hlinkClick r:id="rId2"/>
+                </a:rPr>
+                <a:t>Impact Evaluator Git repository</a:t>
+              </a:r>
+              <a:endParaRPr lang="en-US" sz="1100" b="0" dirty="0">
+                <a:effectLst/>
+              </a:endParaRPr>
+            </a:p>
+          </p:txBody>
+        </p:sp>
+      </p:grpSp>
     </p:spTree>
     <p:extLst>
       <p:ext uri="{BB962C8B-B14F-4D97-AF65-F5344CB8AC3E}">

</xml_diff>